<commit_message>
ajout dossier pour interface utilisateur html/css/js
</commit_message>
<xml_diff>
--- a/site.pptx
+++ b/site.pptx
@@ -216,7 +216,7 @@
           <a:p>
             <a:fld id="{B7645D61-5D6C-4376-9CCC-80882C21C87E}" type="datetimeFigureOut">
               <a:rPr lang="fr-FR" smtClean="0"/>
-              <a:t>03/02/2021</a:t>
+              <a:t>05/02/2021</a:t>
             </a:fld>
             <a:endParaRPr lang="fr-FR"/>
           </a:p>
@@ -534,11 +534,7 @@
             </a:r>
             <a:r>
               <a:rPr lang="fr-FR" baseline="0" dirty="0" smtClean="0"/>
-              <a:t> pour tout le </a:t>
-            </a:r>
-            <a:r>
-              <a:rPr lang="fr-FR" baseline="0" dirty="0" smtClean="0"/>
-              <a:t>monde    CODE : Noir -&gt; lien accueil, ROUGE -&gt; lien, VERT -&gt; lien, BLANC -&gt; Champs à remplir, ORANGE -&gt; </a:t>
+              <a:t> pour tout le monde    CODE : Noir -&gt; lien accueil, ROUGE -&gt; lien, VERT -&gt; lien, BLANC -&gt; Champs à remplir, ORANGE -&gt; </a:t>
             </a:r>
             <a:r>
               <a:rPr lang="fr-FR" baseline="0" dirty="0" err="1" smtClean="0"/>
@@ -1086,11 +1082,7 @@
             </a:r>
             <a:r>
               <a:rPr lang="fr-FR" baseline="0" dirty="0" smtClean="0"/>
-              <a:t>/ Créateur clic sur voir </a:t>
-            </a:r>
-            <a:r>
-              <a:rPr lang="fr-FR" baseline="0" dirty="0" smtClean="0"/>
-              <a:t>rouge</a:t>
+              <a:t>/ Créateur clic sur voir rouge</a:t>
             </a:r>
             <a:endParaRPr lang="fr-FR" dirty="0"/>
           </a:p>
@@ -1182,11 +1174,7 @@
             </a:r>
             <a:r>
               <a:rPr lang="fr-FR" baseline="0" dirty="0" smtClean="0"/>
-              <a:t>/ Créateur clic sur voir </a:t>
-            </a:r>
-            <a:r>
-              <a:rPr lang="fr-FR" baseline="0" dirty="0" smtClean="0"/>
-              <a:t>vert</a:t>
+              <a:t>/ Créateur clic sur voir vert</a:t>
             </a:r>
             <a:endParaRPr lang="fr-FR" dirty="0"/>
           </a:p>
@@ -1509,7 +1497,7 @@
           <a:p>
             <a:fld id="{AA309A6D-C09C-4548-B29A-6CF363A7E532}" type="datetimeFigureOut">
               <a:rPr lang="fr-FR" smtClean="0"/>
-              <a:t>03/02/2021</a:t>
+              <a:t>05/02/2021</a:t>
             </a:fld>
             <a:endParaRPr lang="fr-BE"/>
           </a:p>
@@ -1674,7 +1662,7 @@
           <a:p>
             <a:fld id="{AA309A6D-C09C-4548-B29A-6CF363A7E532}" type="datetimeFigureOut">
               <a:rPr lang="fr-FR" smtClean="0"/>
-              <a:t>03/02/2021</a:t>
+              <a:t>05/02/2021</a:t>
             </a:fld>
             <a:endParaRPr lang="fr-BE"/>
           </a:p>
@@ -1849,7 +1837,7 @@
           <a:p>
             <a:fld id="{AA309A6D-C09C-4548-B29A-6CF363A7E532}" type="datetimeFigureOut">
               <a:rPr lang="fr-FR" smtClean="0"/>
-              <a:t>03/02/2021</a:t>
+              <a:t>05/02/2021</a:t>
             </a:fld>
             <a:endParaRPr lang="fr-BE"/>
           </a:p>
@@ -2014,7 +2002,7 @@
           <a:p>
             <a:fld id="{AA309A6D-C09C-4548-B29A-6CF363A7E532}" type="datetimeFigureOut">
               <a:rPr lang="fr-FR" smtClean="0"/>
-              <a:t>03/02/2021</a:t>
+              <a:t>05/02/2021</a:t>
             </a:fld>
             <a:endParaRPr lang="fr-BE"/>
           </a:p>
@@ -2255,7 +2243,7 @@
           <a:p>
             <a:fld id="{AA309A6D-C09C-4548-B29A-6CF363A7E532}" type="datetimeFigureOut">
               <a:rPr lang="fr-FR" smtClean="0"/>
-              <a:t>03/02/2021</a:t>
+              <a:t>05/02/2021</a:t>
             </a:fld>
             <a:endParaRPr lang="fr-BE"/>
           </a:p>
@@ -2538,7 +2526,7 @@
           <a:p>
             <a:fld id="{AA309A6D-C09C-4548-B29A-6CF363A7E532}" type="datetimeFigureOut">
               <a:rPr lang="fr-FR" smtClean="0"/>
-              <a:t>03/02/2021</a:t>
+              <a:t>05/02/2021</a:t>
             </a:fld>
             <a:endParaRPr lang="fr-BE"/>
           </a:p>
@@ -2955,7 +2943,7 @@
           <a:p>
             <a:fld id="{AA309A6D-C09C-4548-B29A-6CF363A7E532}" type="datetimeFigureOut">
               <a:rPr lang="fr-FR" smtClean="0"/>
-              <a:t>03/02/2021</a:t>
+              <a:t>05/02/2021</a:t>
             </a:fld>
             <a:endParaRPr lang="fr-BE"/>
           </a:p>
@@ -3068,7 +3056,7 @@
           <a:p>
             <a:fld id="{AA309A6D-C09C-4548-B29A-6CF363A7E532}" type="datetimeFigureOut">
               <a:rPr lang="fr-FR" smtClean="0"/>
-              <a:t>03/02/2021</a:t>
+              <a:t>05/02/2021</a:t>
             </a:fld>
             <a:endParaRPr lang="fr-BE"/>
           </a:p>
@@ -3158,7 +3146,7 @@
           <a:p>
             <a:fld id="{AA309A6D-C09C-4548-B29A-6CF363A7E532}" type="datetimeFigureOut">
               <a:rPr lang="fr-FR" smtClean="0"/>
-              <a:t>03/02/2021</a:t>
+              <a:t>05/02/2021</a:t>
             </a:fld>
             <a:endParaRPr lang="fr-BE"/>
           </a:p>
@@ -3430,7 +3418,7 @@
           <a:p>
             <a:fld id="{AA309A6D-C09C-4548-B29A-6CF363A7E532}" type="datetimeFigureOut">
               <a:rPr lang="fr-FR" smtClean="0"/>
-              <a:t>03/02/2021</a:t>
+              <a:t>05/02/2021</a:t>
             </a:fld>
             <a:endParaRPr lang="fr-BE"/>
           </a:p>
@@ -3678,7 +3666,7 @@
           <a:p>
             <a:fld id="{AA309A6D-C09C-4548-B29A-6CF363A7E532}" type="datetimeFigureOut">
               <a:rPr lang="fr-FR" smtClean="0"/>
-              <a:t>03/02/2021</a:t>
+              <a:t>05/02/2021</a:t>
             </a:fld>
             <a:endParaRPr lang="fr-BE"/>
           </a:p>
@@ -3886,7 +3874,7 @@
           <a:p>
             <a:fld id="{AA309A6D-C09C-4548-B29A-6CF363A7E532}" type="datetimeFigureOut">
               <a:rPr lang="fr-FR" smtClean="0"/>
-              <a:t>03/02/2021</a:t>
+              <a:t>05/02/2021</a:t>
             </a:fld>
             <a:endParaRPr lang="fr-BE"/>
           </a:p>
@@ -6009,15 +5997,7 @@
                   <a:schemeClr val="bg1"/>
                 </a:solidFill>
               </a:rPr>
-              <a:t>Enoncé </a:t>
-            </a:r>
-            <a:r>
-              <a:rPr lang="fr-FR" sz="1600" dirty="0" smtClean="0">
-                <a:solidFill>
-                  <a:schemeClr val="bg1"/>
-                </a:solidFill>
-              </a:rPr>
-              <a:t>question 1 :</a:t>
+              <a:t>Enoncé question 1 :</a:t>
             </a:r>
           </a:p>
           <a:p>
@@ -6052,15 +6032,7 @@
                   <a:schemeClr val="bg1"/>
                 </a:solidFill>
               </a:rPr>
-              <a:t>Enoncé </a:t>
-            </a:r>
-            <a:r>
-              <a:rPr lang="fr-FR" sz="1600" dirty="0" smtClean="0">
-                <a:solidFill>
-                  <a:schemeClr val="bg1"/>
-                </a:solidFill>
-              </a:rPr>
-              <a:t>question 2 : </a:t>
+              <a:t>Enoncé question 2 : </a:t>
             </a:r>
           </a:p>
           <a:p>
@@ -8681,15 +8653,7 @@
                   <a:schemeClr val="bg1"/>
                 </a:solidFill>
               </a:rPr>
-              <a:t>Enoncé </a:t>
-            </a:r>
-            <a:r>
-              <a:rPr lang="fr-FR" sz="1600" dirty="0" smtClean="0">
-                <a:solidFill>
-                  <a:schemeClr val="bg1"/>
-                </a:solidFill>
-              </a:rPr>
-              <a:t>question 1 :</a:t>
+              <a:t>Enoncé question 1 :</a:t>
             </a:r>
           </a:p>
           <a:p>
@@ -8707,15 +8671,75 @@
                   <a:schemeClr val="bg1"/>
                 </a:solidFill>
               </a:rPr>
-              <a:t>      proposition 1         proposition 2         </a:t>
-            </a:r>
+              <a:t>      proposition 1         proposition 2         proposition3</a:t>
+            </a:r>
+          </a:p>
+          <a:p>
+            <a:endParaRPr lang="fr-FR" sz="1600" dirty="0" smtClean="0">
+              <a:solidFill>
+                <a:schemeClr val="bg1"/>
+              </a:solidFill>
+            </a:endParaRPr>
+          </a:p>
+          <a:p>
+            <a:endParaRPr lang="fr-FR" sz="1600" dirty="0" smtClean="0">
+              <a:solidFill>
+                <a:schemeClr val="bg1"/>
+              </a:solidFill>
+            </a:endParaRPr>
+          </a:p>
+          <a:p>
             <a:r>
               <a:rPr lang="fr-FR" sz="1600" dirty="0" smtClean="0">
                 <a:solidFill>
                   <a:schemeClr val="bg1"/>
                 </a:solidFill>
               </a:rPr>
-              <a:t>proposition3</a:t>
+              <a:t>Enoncé question 2 : </a:t>
+            </a:r>
+          </a:p>
+          <a:p>
+            <a:r>
+              <a:rPr lang="fr-FR" sz="1600" dirty="0">
+                <a:solidFill>
+                  <a:schemeClr val="bg1"/>
+                </a:solidFill>
+              </a:rPr>
+              <a:t> </a:t>
+            </a:r>
+            <a:r>
+              <a:rPr lang="fr-FR" sz="1600" dirty="0" smtClean="0">
+                <a:solidFill>
+                  <a:schemeClr val="bg1"/>
+                </a:solidFill>
+              </a:rPr>
+              <a:t>      proposition 1	proposition 2         proposition 3</a:t>
+            </a:r>
+          </a:p>
+          <a:p>
+            <a:r>
+              <a:rPr lang="fr-FR" sz="1600" dirty="0" smtClean="0">
+                <a:solidFill>
+                  <a:schemeClr val="bg1"/>
+                </a:solidFill>
+              </a:rPr>
+              <a:t>       proposition 4</a:t>
+            </a:r>
+            <a:r>
+              <a:rPr lang="fr-FR" sz="1600" dirty="0">
+                <a:solidFill>
+                  <a:schemeClr val="bg1"/>
+                </a:solidFill>
+              </a:rPr>
+              <a:t>	</a:t>
+            </a:r>
+            <a:r>
+              <a:rPr lang="fr-FR" sz="1600" dirty="0" smtClean="0">
+                <a:solidFill>
+                  <a:schemeClr val="bg1"/>
+                </a:solidFill>
+              </a:rPr>
+              <a:t>proposition 5     </a:t>
             </a:r>
           </a:p>
           <a:p>
@@ -8726,7 +8750,7 @@
             </a:endParaRPr>
           </a:p>
           <a:p>
-            <a:endParaRPr lang="fr-FR" sz="1600" dirty="0" smtClean="0">
+            <a:endParaRPr lang="fr-FR" sz="1600" dirty="0">
               <a:solidFill>
                 <a:schemeClr val="bg1"/>
               </a:solidFill>
@@ -8742,119 +8766,6 @@
               <a:t>Enoncé </a:t>
             </a:r>
             <a:r>
-              <a:rPr lang="fr-FR" sz="1600" dirty="0" smtClean="0">
-                <a:solidFill>
-                  <a:schemeClr val="bg1"/>
-                </a:solidFill>
-              </a:rPr>
-              <a:t>question 2 : </a:t>
-            </a:r>
-          </a:p>
-          <a:p>
-            <a:r>
-              <a:rPr lang="fr-FR" sz="1600" dirty="0">
-                <a:solidFill>
-                  <a:schemeClr val="bg1"/>
-                </a:solidFill>
-              </a:rPr>
-              <a:t> </a:t>
-            </a:r>
-            <a:r>
-              <a:rPr lang="fr-FR" sz="1600" dirty="0" smtClean="0">
-                <a:solidFill>
-                  <a:schemeClr val="bg1"/>
-                </a:solidFill>
-              </a:rPr>
-              <a:t>      proposition 1	</a:t>
-            </a:r>
-            <a:r>
-              <a:rPr lang="fr-FR" sz="1600" dirty="0" smtClean="0">
-                <a:solidFill>
-                  <a:schemeClr val="bg1"/>
-                </a:solidFill>
-              </a:rPr>
-              <a:t>proposition </a:t>
-            </a:r>
-            <a:r>
-              <a:rPr lang="fr-FR" sz="1600" dirty="0" smtClean="0">
-                <a:solidFill>
-                  <a:schemeClr val="bg1"/>
-                </a:solidFill>
-              </a:rPr>
-              <a:t>2         proposition 3</a:t>
-            </a:r>
-          </a:p>
-          <a:p>
-            <a:r>
-              <a:rPr lang="fr-FR" sz="1600" dirty="0" smtClean="0">
-                <a:solidFill>
-                  <a:schemeClr val="bg1"/>
-                </a:solidFill>
-              </a:rPr>
-              <a:t>       proposition </a:t>
-            </a:r>
-            <a:r>
-              <a:rPr lang="fr-FR" sz="1600" dirty="0" smtClean="0">
-                <a:solidFill>
-                  <a:schemeClr val="bg1"/>
-                </a:solidFill>
-              </a:rPr>
-              <a:t>4</a:t>
-            </a:r>
-            <a:r>
-              <a:rPr lang="fr-FR" sz="1600" dirty="0">
-                <a:solidFill>
-                  <a:schemeClr val="bg1"/>
-                </a:solidFill>
-              </a:rPr>
-              <a:t>	</a:t>
-            </a:r>
-            <a:r>
-              <a:rPr lang="fr-FR" sz="1600" dirty="0" smtClean="0">
-                <a:solidFill>
-                  <a:schemeClr val="bg1"/>
-                </a:solidFill>
-              </a:rPr>
-              <a:t>proposition </a:t>
-            </a:r>
-            <a:r>
-              <a:rPr lang="fr-FR" sz="1600" dirty="0" smtClean="0">
-                <a:solidFill>
-                  <a:schemeClr val="bg1"/>
-                </a:solidFill>
-              </a:rPr>
-              <a:t>5     </a:t>
-            </a:r>
-            <a:endParaRPr lang="fr-FR" sz="1600" dirty="0" smtClean="0">
-              <a:solidFill>
-                <a:schemeClr val="bg1"/>
-              </a:solidFill>
-            </a:endParaRPr>
-          </a:p>
-          <a:p>
-            <a:endParaRPr lang="fr-FR" sz="1600" dirty="0" smtClean="0">
-              <a:solidFill>
-                <a:schemeClr val="bg1"/>
-              </a:solidFill>
-            </a:endParaRPr>
-          </a:p>
-          <a:p>
-            <a:endParaRPr lang="fr-FR" sz="1600" dirty="0">
-              <a:solidFill>
-                <a:schemeClr val="bg1"/>
-              </a:solidFill>
-            </a:endParaRPr>
-          </a:p>
-          <a:p>
-            <a:r>
-              <a:rPr lang="fr-FR" sz="1600" dirty="0" smtClean="0">
-                <a:solidFill>
-                  <a:schemeClr val="bg1"/>
-                </a:solidFill>
-              </a:rPr>
-              <a:t>Enoncé </a:t>
-            </a:r>
-            <a:r>
               <a:rPr lang="fr-FR" sz="1600" dirty="0">
                 <a:solidFill>
                   <a:schemeClr val="bg1"/>
@@ -8891,31 +8802,7 @@
                   <a:schemeClr val="bg1"/>
                 </a:solidFill>
               </a:rPr>
-              <a:t>     </a:t>
-            </a:r>
-            <a:r>
-              <a:rPr lang="fr-FR" sz="1600" dirty="0" smtClean="0">
-                <a:solidFill>
-                  <a:schemeClr val="bg1"/>
-                </a:solidFill>
-              </a:rPr>
-              <a:t>   </a:t>
-            </a:r>
-            <a:r>
-              <a:rPr lang="fr-FR" sz="1600" dirty="0" smtClean="0">
-                <a:solidFill>
-                  <a:schemeClr val="bg1"/>
-                </a:solidFill>
-              </a:rPr>
-              <a:t>oui/vrai	</a:t>
-            </a:r>
-            <a:r>
-              <a:rPr lang="fr-FR" sz="1600" dirty="0" smtClean="0">
-                <a:solidFill>
-                  <a:schemeClr val="bg1"/>
-                </a:solidFill>
-              </a:rPr>
-              <a:t>non/faux</a:t>
+              <a:t>        oui/vrai	non/faux</a:t>
             </a:r>
           </a:p>
           <a:p>
@@ -10466,15 +10353,7 @@
                   <a:schemeClr val="bg1"/>
                 </a:solidFill>
               </a:rPr>
-              <a:t>Enoncé </a:t>
-            </a:r>
-            <a:r>
-              <a:rPr lang="fr-FR" sz="1600" dirty="0" smtClean="0">
-                <a:solidFill>
-                  <a:schemeClr val="bg1"/>
-                </a:solidFill>
-              </a:rPr>
-              <a:t>question 1 :</a:t>
+              <a:t>Enoncé question 1 :</a:t>
             </a:r>
           </a:p>
           <a:p>
@@ -10492,15 +10371,75 @@
                   <a:schemeClr val="bg1"/>
                 </a:solidFill>
               </a:rPr>
-              <a:t>      proposition 1         proposition 2         </a:t>
-            </a:r>
+              <a:t>      proposition 1         proposition 2         proposition3</a:t>
+            </a:r>
+          </a:p>
+          <a:p>
+            <a:endParaRPr lang="fr-FR" sz="1600" dirty="0" smtClean="0">
+              <a:solidFill>
+                <a:schemeClr val="bg1"/>
+              </a:solidFill>
+            </a:endParaRPr>
+          </a:p>
+          <a:p>
+            <a:endParaRPr lang="fr-FR" sz="1600" dirty="0" smtClean="0">
+              <a:solidFill>
+                <a:schemeClr val="bg1"/>
+              </a:solidFill>
+            </a:endParaRPr>
+          </a:p>
+          <a:p>
             <a:r>
               <a:rPr lang="fr-FR" sz="1600" dirty="0" smtClean="0">
                 <a:solidFill>
                   <a:schemeClr val="bg1"/>
                 </a:solidFill>
               </a:rPr>
-              <a:t>proposition3</a:t>
+              <a:t>Enoncé question 2 : </a:t>
+            </a:r>
+          </a:p>
+          <a:p>
+            <a:r>
+              <a:rPr lang="fr-FR" sz="1600" dirty="0">
+                <a:solidFill>
+                  <a:schemeClr val="bg1"/>
+                </a:solidFill>
+              </a:rPr>
+              <a:t> </a:t>
+            </a:r>
+            <a:r>
+              <a:rPr lang="fr-FR" sz="1600" dirty="0" smtClean="0">
+                <a:solidFill>
+                  <a:schemeClr val="bg1"/>
+                </a:solidFill>
+              </a:rPr>
+              <a:t>      proposition 1	proposition 2         proposition 3</a:t>
+            </a:r>
+          </a:p>
+          <a:p>
+            <a:r>
+              <a:rPr lang="fr-FR" sz="1600" dirty="0" smtClean="0">
+                <a:solidFill>
+                  <a:schemeClr val="bg1"/>
+                </a:solidFill>
+              </a:rPr>
+              <a:t>       proposition 4</a:t>
+            </a:r>
+            <a:r>
+              <a:rPr lang="fr-FR" sz="1600" dirty="0">
+                <a:solidFill>
+                  <a:schemeClr val="bg1"/>
+                </a:solidFill>
+              </a:rPr>
+              <a:t>	</a:t>
+            </a:r>
+            <a:r>
+              <a:rPr lang="fr-FR" sz="1600" dirty="0" smtClean="0">
+                <a:solidFill>
+                  <a:schemeClr val="bg1"/>
+                </a:solidFill>
+              </a:rPr>
+              <a:t>proposition 5     </a:t>
             </a:r>
           </a:p>
           <a:p>
@@ -10511,7 +10450,7 @@
             </a:endParaRPr>
           </a:p>
           <a:p>
-            <a:endParaRPr lang="fr-FR" sz="1600" dirty="0" smtClean="0">
+            <a:endParaRPr lang="fr-FR" sz="1600" dirty="0">
               <a:solidFill>
                 <a:schemeClr val="bg1"/>
               </a:solidFill>
@@ -10527,119 +10466,6 @@
               <a:t>Enoncé </a:t>
             </a:r>
             <a:r>
-              <a:rPr lang="fr-FR" sz="1600" dirty="0" smtClean="0">
-                <a:solidFill>
-                  <a:schemeClr val="bg1"/>
-                </a:solidFill>
-              </a:rPr>
-              <a:t>question 2 : </a:t>
-            </a:r>
-          </a:p>
-          <a:p>
-            <a:r>
-              <a:rPr lang="fr-FR" sz="1600" dirty="0">
-                <a:solidFill>
-                  <a:schemeClr val="bg1"/>
-                </a:solidFill>
-              </a:rPr>
-              <a:t> </a:t>
-            </a:r>
-            <a:r>
-              <a:rPr lang="fr-FR" sz="1600" dirty="0" smtClean="0">
-                <a:solidFill>
-                  <a:schemeClr val="bg1"/>
-                </a:solidFill>
-              </a:rPr>
-              <a:t>      proposition 1	</a:t>
-            </a:r>
-            <a:r>
-              <a:rPr lang="fr-FR" sz="1600" dirty="0" smtClean="0">
-                <a:solidFill>
-                  <a:schemeClr val="bg1"/>
-                </a:solidFill>
-              </a:rPr>
-              <a:t>proposition </a:t>
-            </a:r>
-            <a:r>
-              <a:rPr lang="fr-FR" sz="1600" dirty="0" smtClean="0">
-                <a:solidFill>
-                  <a:schemeClr val="bg1"/>
-                </a:solidFill>
-              </a:rPr>
-              <a:t>2         proposition 3</a:t>
-            </a:r>
-          </a:p>
-          <a:p>
-            <a:r>
-              <a:rPr lang="fr-FR" sz="1600" dirty="0" smtClean="0">
-                <a:solidFill>
-                  <a:schemeClr val="bg1"/>
-                </a:solidFill>
-              </a:rPr>
-              <a:t>       proposition </a:t>
-            </a:r>
-            <a:r>
-              <a:rPr lang="fr-FR" sz="1600" dirty="0" smtClean="0">
-                <a:solidFill>
-                  <a:schemeClr val="bg1"/>
-                </a:solidFill>
-              </a:rPr>
-              <a:t>4</a:t>
-            </a:r>
-            <a:r>
-              <a:rPr lang="fr-FR" sz="1600" dirty="0">
-                <a:solidFill>
-                  <a:schemeClr val="bg1"/>
-                </a:solidFill>
-              </a:rPr>
-              <a:t>	</a:t>
-            </a:r>
-            <a:r>
-              <a:rPr lang="fr-FR" sz="1600" dirty="0" smtClean="0">
-                <a:solidFill>
-                  <a:schemeClr val="bg1"/>
-                </a:solidFill>
-              </a:rPr>
-              <a:t>proposition </a:t>
-            </a:r>
-            <a:r>
-              <a:rPr lang="fr-FR" sz="1600" dirty="0" smtClean="0">
-                <a:solidFill>
-                  <a:schemeClr val="bg1"/>
-                </a:solidFill>
-              </a:rPr>
-              <a:t>5     </a:t>
-            </a:r>
-            <a:endParaRPr lang="fr-FR" sz="1600" dirty="0" smtClean="0">
-              <a:solidFill>
-                <a:schemeClr val="bg1"/>
-              </a:solidFill>
-            </a:endParaRPr>
-          </a:p>
-          <a:p>
-            <a:endParaRPr lang="fr-FR" sz="1600" dirty="0" smtClean="0">
-              <a:solidFill>
-                <a:schemeClr val="bg1"/>
-              </a:solidFill>
-            </a:endParaRPr>
-          </a:p>
-          <a:p>
-            <a:endParaRPr lang="fr-FR" sz="1600" dirty="0">
-              <a:solidFill>
-                <a:schemeClr val="bg1"/>
-              </a:solidFill>
-            </a:endParaRPr>
-          </a:p>
-          <a:p>
-            <a:r>
-              <a:rPr lang="fr-FR" sz="1600" dirty="0" smtClean="0">
-                <a:solidFill>
-                  <a:schemeClr val="bg1"/>
-                </a:solidFill>
-              </a:rPr>
-              <a:t>Enoncé </a:t>
-            </a:r>
-            <a:r>
               <a:rPr lang="fr-FR" sz="1600" dirty="0">
                 <a:solidFill>
                   <a:schemeClr val="bg1"/>
@@ -10676,31 +10502,7 @@
                   <a:schemeClr val="bg1"/>
                 </a:solidFill>
               </a:rPr>
-              <a:t>     </a:t>
-            </a:r>
-            <a:r>
-              <a:rPr lang="fr-FR" sz="1600" dirty="0" smtClean="0">
-                <a:solidFill>
-                  <a:schemeClr val="bg1"/>
-                </a:solidFill>
-              </a:rPr>
-              <a:t>   </a:t>
-            </a:r>
-            <a:r>
-              <a:rPr lang="fr-FR" sz="1600" dirty="0" smtClean="0">
-                <a:solidFill>
-                  <a:schemeClr val="bg1"/>
-                </a:solidFill>
-              </a:rPr>
-              <a:t>oui/vrai	</a:t>
-            </a:r>
-            <a:r>
-              <a:rPr lang="fr-FR" sz="1600" dirty="0" smtClean="0">
-                <a:solidFill>
-                  <a:schemeClr val="bg1"/>
-                </a:solidFill>
-              </a:rPr>
-              <a:t>non/faux</a:t>
+              <a:t>        oui/vrai	non/faux</a:t>
             </a:r>
           </a:p>
           <a:p>
@@ -11617,11 +11419,6 @@
               </a:rPr>
               <a:t>Commentaire qui le correcteur à fait</a:t>
             </a:r>
-            <a:endParaRPr lang="fr-FR" dirty="0">
-              <a:solidFill>
-                <a:schemeClr val="tx1"/>
-              </a:solidFill>
-            </a:endParaRPr>
           </a:p>
         </p:txBody>
       </p:sp>
@@ -11677,11 +11474,6 @@
               </a:rPr>
               <a:t>Commentaire qui le correcteur à fait</a:t>
             </a:r>
-            <a:endParaRPr lang="fr-FR" dirty="0">
-              <a:solidFill>
-                <a:schemeClr val="tx1"/>
-              </a:solidFill>
-            </a:endParaRPr>
           </a:p>
         </p:txBody>
       </p:sp>
@@ -13450,15 +13242,7 @@
                   <a:schemeClr val="tx1"/>
                 </a:solidFill>
               </a:rPr>
-              <a:t>Ex : non</a:t>
-            </a:r>
-            <a:r>
-              <a:rPr lang="fr-FR" sz="1400" dirty="0" smtClean="0">
-                <a:solidFill>
-                  <a:schemeClr val="tx1"/>
-                </a:solidFill>
-              </a:rPr>
-              <a:t>/Faux</a:t>
+              <a:t>Ex : non/Faux</a:t>
             </a:r>
             <a:endParaRPr lang="fr-FR" sz="1400" dirty="0">
               <a:solidFill>
@@ -13568,7 +13352,6 @@
               <a:rPr lang="fr-FR" sz="1200" dirty="0"/>
               <a:t>5</a:t>
             </a:r>
-            <a:endParaRPr lang="fr-FR" sz="1200" dirty="0"/>
           </a:p>
         </p:txBody>
       </p:sp>

</xml_diff>